<commit_message>
Update to powerpoint file.
</commit_message>
<xml_diff>
--- a/Time Series Presentation.pptx
+++ b/Time Series Presentation.pptx
@@ -5,7 +5,7 @@
     <p:sldMasterId id="2147483658" r:id="rId1"/>
   </p:sldMasterIdLst>
   <p:notesMasterIdLst>
-    <p:notesMasterId r:id="rId10"/>
+    <p:notesMasterId r:id="rId9"/>
   </p:notesMasterIdLst>
   <p:sldIdLst>
     <p:sldId id="256" r:id="rId2"/>
@@ -13,23 +13,22 @@
     <p:sldId id="259" r:id="rId4"/>
     <p:sldId id="261" r:id="rId5"/>
     <p:sldId id="262" r:id="rId6"/>
-    <p:sldId id="263" r:id="rId7"/>
-    <p:sldId id="264" r:id="rId8"/>
-    <p:sldId id="270" r:id="rId9"/>
+    <p:sldId id="264" r:id="rId7"/>
+    <p:sldId id="270" r:id="rId8"/>
   </p:sldIdLst>
   <p:sldSz cx="9144000" cy="5143500" type="screen16x9"/>
   <p:notesSz cx="6858000" cy="9144000"/>
   <p:embeddedFontLst>
     <p:embeddedFont>
       <p:font typeface="Abril Fatface" charset="0"/>
-      <p:regular r:id="rId11"/>
+      <p:regular r:id="rId10"/>
     </p:embeddedFont>
     <p:embeddedFont>
       <p:font typeface="Raleway" charset="0"/>
-      <p:regular r:id="rId12"/>
-      <p:bold r:id="rId13"/>
-      <p:italic r:id="rId14"/>
-      <p:boldItalic r:id="rId15"/>
+      <p:regular r:id="rId11"/>
+      <p:bold r:id="rId12"/>
+      <p:italic r:id="rId13"/>
+      <p:boldItalic r:id="rId14"/>
     </p:embeddedFont>
   </p:embeddedFontLst>
   <p:defaultTextStyle>
@@ -1185,6 +1184,13 @@
         </dgm:presLayoutVars>
       </dgm:prSet>
       <dgm:spPr/>
+      <dgm:t>
+        <a:bodyPr/>
+        <a:lstStyle/>
+        <a:p>
+          <a:endParaRPr lang="en-US"/>
+        </a:p>
+      </dgm:t>
     </dgm:pt>
     <dgm:pt modelId="{E6EE3E83-10C1-4EEA-AFCB-EFB2A0D81EC2}" type="pres">
       <dgm:prSet presAssocID="{5AC36C56-CD2B-453D-95FC-360ABC9A57BD}" presName="parTxOnlySpace" presStyleCnt="0"/>
@@ -1220,6 +1226,13 @@
         </dgm:presLayoutVars>
       </dgm:prSet>
       <dgm:spPr/>
+      <dgm:t>
+        <a:bodyPr/>
+        <a:lstStyle/>
+        <a:p>
+          <a:endParaRPr lang="en-US"/>
+        </a:p>
+      </dgm:t>
     </dgm:pt>
     <dgm:pt modelId="{918EAA9C-7914-4049-ACFC-88F61197AA66}" type="pres">
       <dgm:prSet presAssocID="{2A47B072-FE5C-447A-A5C2-A6F48A5323EE}" presName="parTxOnlySpace" presStyleCnt="0"/>
@@ -3549,110 +3562,6 @@
   <p:cSld>
     <p:spTree>
       <p:nvGrpSpPr>
-        <p:cNvPr id="1" name="Shape 125"/>
-        <p:cNvGrpSpPr/>
-        <p:nvPr/>
-      </p:nvGrpSpPr>
-      <p:grpSpPr>
-        <a:xfrm>
-          <a:off x="0" y="0"/>
-          <a:ext cx="0" cy="0"/>
-          <a:chOff x="0" y="0"/>
-          <a:chExt cx="0" cy="0"/>
-        </a:xfrm>
-      </p:grpSpPr>
-      <p:sp>
-        <p:nvSpPr>
-          <p:cNvPr id="126" name="Google Shape;126;g35f391192_017:notes"/>
-          <p:cNvSpPr>
-            <a:spLocks noGrp="1" noRot="1" noChangeAspect="1"/>
-          </p:cNvSpPr>
-          <p:nvPr>
-            <p:ph type="sldImg" idx="2"/>
-          </p:nvPr>
-        </p:nvSpPr>
-        <p:spPr>
-          <a:xfrm>
-            <a:off x="381000" y="685800"/>
-            <a:ext cx="6096000" cy="3429000"/>
-          </a:xfrm>
-          <a:custGeom>
-            <a:avLst/>
-            <a:gdLst/>
-            <a:ahLst/>
-            <a:cxnLst/>
-            <a:rect l="l" t="t" r="r" b="b"/>
-            <a:pathLst>
-              <a:path w="120000" h="120000" extrusionOk="0">
-                <a:moveTo>
-                  <a:pt x="0" y="0"/>
-                </a:moveTo>
-                <a:lnTo>
-                  <a:pt x="120000" y="0"/>
-                </a:lnTo>
-                <a:lnTo>
-                  <a:pt x="120000" y="120000"/>
-                </a:lnTo>
-                <a:lnTo>
-                  <a:pt x="0" y="120000"/>
-                </a:lnTo>
-                <a:close/>
-              </a:path>
-            </a:pathLst>
-          </a:custGeom>
-        </p:spPr>
-      </p:sp>
-      <p:sp>
-        <p:nvSpPr>
-          <p:cNvPr id="127" name="Google Shape;127;g35f391192_017:notes"/>
-          <p:cNvSpPr txBox="1">
-            <a:spLocks noGrp="1"/>
-          </p:cNvSpPr>
-          <p:nvPr>
-            <p:ph type="body" idx="1"/>
-          </p:nvPr>
-        </p:nvSpPr>
-        <p:spPr>
-          <a:xfrm>
-            <a:off x="685800" y="4343400"/>
-            <a:ext cx="5486400" cy="4114800"/>
-          </a:xfrm>
-          <a:prstGeom prst="rect">
-            <a:avLst/>
-          </a:prstGeom>
-        </p:spPr>
-        <p:txBody>
-          <a:bodyPr spcFirstLastPara="1" wrap="square" lIns="91425" tIns="91425" rIns="91425" bIns="91425" anchor="t" anchorCtr="0">
-            <a:noAutofit/>
-          </a:bodyPr>
-          <a:lstStyle/>
-          <a:p>
-            <a:pPr marL="0" lvl="0" indent="0" algn="l" rtl="0">
-              <a:spcBef>
-                <a:spcPts val="0"/>
-              </a:spcBef>
-              <a:spcAft>
-                <a:spcPts val="0"/>
-              </a:spcAft>
-              <a:buNone/>
-            </a:pPr>
-            <a:endParaRPr/>
-          </a:p>
-        </p:txBody>
-      </p:sp>
-    </p:spTree>
-  </p:cSld>
-  <p:clrMapOvr>
-    <a:masterClrMapping/>
-  </p:clrMapOvr>
-</p:notes>
-</file>
-
-<file path=ppt/notesSlides/notesSlide7.xml><?xml version="1.0" encoding="utf-8"?>
-<p:notes xmlns:a="http://schemas.openxmlformats.org/drawingml/2006/main" xmlns:r="http://schemas.openxmlformats.org/officeDocument/2006/relationships" xmlns:p="http://schemas.openxmlformats.org/presentationml/2006/main" showMasterSp="0" showMasterPhAnim="0">
-  <p:cSld>
-    <p:spTree>
-      <p:nvGrpSpPr>
         <p:cNvPr id="1" name="Shape 133"/>
         <p:cNvGrpSpPr/>
         <p:nvPr/>
@@ -3752,7 +3661,7 @@
 </p:notes>
 </file>
 
-<file path=ppt/notesSlides/notesSlide8.xml><?xml version="1.0" encoding="utf-8"?>
+<file path=ppt/notesSlides/notesSlide7.xml><?xml version="1.0" encoding="utf-8"?>
 <p:notes xmlns:a="http://schemas.openxmlformats.org/drawingml/2006/main" xmlns:r="http://schemas.openxmlformats.org/officeDocument/2006/relationships" xmlns:p="http://schemas.openxmlformats.org/presentationml/2006/main" showMasterSp="0" showMasterPhAnim="0">
   <p:cSld>
     <p:spTree>
@@ -8445,6 +8354,13 @@
   <p:clrMapOvr>
     <a:masterClrMapping/>
   </p:clrMapOvr>
+  <p:timing>
+    <p:tnLst>
+      <p:par>
+        <p:cTn id="1" dur="indefinite" restart="never" nodeType="tmRoot"/>
+      </p:par>
+    </p:tnLst>
+  </p:timing>
 </p:sld>
 </file>
 
@@ -8668,19 +8584,7 @@
             </a:pPr>
             <a:r>
               <a:rPr lang="en-US" sz="1200" dirty="0" smtClean="0"/>
-              <a:t>71 Zip Codes</a:t>
-            </a:r>
-            <a:r>
-              <a:rPr lang="en-US" sz="1200" dirty="0" smtClean="0"/>
-              <a:t>	 </a:t>
-            </a:r>
-            <a:r>
-              <a:rPr lang="en-US" sz="1200" dirty="0" smtClean="0"/>
-              <a:t>              30 Cities	</a:t>
-            </a:r>
-            <a:r>
-              <a:rPr lang="en-US" sz="1200" dirty="0" smtClean="0"/>
-              <a:t>5 Counties</a:t>
+              <a:t>71 Zip Codes	               30 Cities	5 Counties</a:t>
             </a:r>
           </a:p>
           <a:p>
@@ -8703,11 +8607,7 @@
             </a:pPr>
             <a:r>
               <a:rPr lang="en-US" sz="1200" dirty="0" smtClean="0"/>
-              <a:t>1.7 Million People (2010 Census)    </a:t>
-            </a:r>
-            <a:r>
-              <a:rPr lang="en-US" sz="1200" dirty="0" smtClean="0"/>
-              <a:t>2.1 Million People (2018 Estimate)</a:t>
+              <a:t>1.7 Million People (2010 Census)    2.1 Million People (2018 Estimate)</a:t>
             </a:r>
           </a:p>
           <a:p>
@@ -8746,13 +8646,8 @@
             </a:r>
             <a:r>
               <a:rPr lang="en-US" sz="1200" dirty="0" smtClean="0"/>
-              <a:t> </a:t>
+              <a:t> Largest Metropolitan Area</a:t>
             </a:r>
-            <a:r>
-              <a:rPr lang="en-US" sz="1200" dirty="0" smtClean="0"/>
-              <a:t>Largest Metropolitan Area</a:t>
-            </a:r>
-            <a:endParaRPr lang="en-US" sz="1200" dirty="0" smtClean="0"/>
           </a:p>
           <a:p>
             <a:pPr marL="0" indent="0" algn="ctr">
@@ -8764,23 +8659,7 @@
             </a:pPr>
             <a:r>
               <a:rPr lang="en-US" sz="1200" dirty="0" smtClean="0"/>
-              <a:t>in Texas </a:t>
-            </a:r>
-            <a:r>
-              <a:rPr lang="en-US" sz="1200" dirty="0" smtClean="0"/>
-              <a:t>		</a:t>
-            </a:r>
-            <a:r>
-              <a:rPr lang="en-US" sz="1200" dirty="0" smtClean="0"/>
-              <a:t> </a:t>
-            </a:r>
-            <a:r>
-              <a:rPr lang="en-US" sz="1200" dirty="0" smtClean="0"/>
-              <a:t>   </a:t>
-            </a:r>
-            <a:r>
-              <a:rPr lang="en-US" sz="1200" dirty="0" smtClean="0"/>
-              <a:t>in United States</a:t>
+              <a:t>in Texas 		    in United States</a:t>
             </a:r>
             <a:endParaRPr sz="1200"/>
           </a:p>
@@ -8842,6 +8721,13 @@
   <p:clrMapOvr>
     <a:masterClrMapping/>
   </p:clrMapOvr>
+  <p:timing>
+    <p:tnLst>
+      <p:par>
+        <p:cTn id="1" dur="indefinite" restart="never" nodeType="tmRoot"/>
+      </p:par>
+    </p:tnLst>
+  </p:timing>
 </p:sld>
 </file>
 
@@ -8976,6 +8862,13 @@
   <p:clrMapOvr>
     <a:masterClrMapping/>
   </p:clrMapOvr>
+  <p:timing>
+    <p:tnLst>
+      <p:par>
+        <p:cTn id="1" dur="indefinite" restart="never" nodeType="tmRoot"/>
+      </p:par>
+    </p:tnLst>
+  </p:timing>
 </p:sld>
 </file>
 
@@ -9396,6 +9289,13 @@
   <p:clrMapOvr>
     <a:masterClrMapping/>
   </p:clrMapOvr>
+  <p:timing>
+    <p:tnLst>
+      <p:par>
+        <p:cTn id="1" dur="indefinite" restart="never" nodeType="tmRoot"/>
+      </p:par>
+    </p:tnLst>
+  </p:timing>
 </p:sld>
 </file>
 
@@ -13096,244 +12996,17 @@
   <p:clrMapOvr>
     <a:masterClrMapping/>
   </p:clrMapOvr>
+  <p:timing>
+    <p:tnLst>
+      <p:par>
+        <p:cTn id="1" dur="indefinite" restart="never" nodeType="tmRoot"/>
+      </p:par>
+    </p:tnLst>
+  </p:timing>
 </p:sld>
 </file>
 
 <file path=ppt/slides/slide6.xml><?xml version="1.0" encoding="utf-8"?>
-<p:sld xmlns:a="http://schemas.openxmlformats.org/drawingml/2006/main" xmlns:r="http://schemas.openxmlformats.org/officeDocument/2006/relationships" xmlns:p="http://schemas.openxmlformats.org/presentationml/2006/main">
-  <p:cSld>
-    <p:spTree>
-      <p:nvGrpSpPr>
-        <p:cNvPr id="1" name="Shape 128"/>
-        <p:cNvGrpSpPr/>
-        <p:nvPr/>
-      </p:nvGrpSpPr>
-      <p:grpSpPr>
-        <a:xfrm>
-          <a:off x="0" y="0"/>
-          <a:ext cx="0" cy="0"/>
-          <a:chOff x="0" y="0"/>
-          <a:chExt cx="0" cy="0"/>
-        </a:xfrm>
-      </p:grpSpPr>
-      <p:sp>
-        <p:nvSpPr>
-          <p:cNvPr id="129" name="Google Shape;129;p19"/>
-          <p:cNvSpPr txBox="1">
-            <a:spLocks noGrp="1"/>
-          </p:cNvSpPr>
-          <p:nvPr>
-            <p:ph type="body" idx="1"/>
-          </p:nvPr>
-        </p:nvSpPr>
-        <p:spPr>
-          <a:xfrm>
-            <a:off x="3604900" y="992250"/>
-            <a:ext cx="2466600" cy="3933000"/>
-          </a:xfrm>
-          <a:prstGeom prst="rect">
-            <a:avLst/>
-          </a:prstGeom>
-        </p:spPr>
-        <p:txBody>
-          <a:bodyPr spcFirstLastPara="1" wrap="square" lIns="91425" tIns="91425" rIns="91425" bIns="91425" anchor="t" anchorCtr="0">
-            <a:noAutofit/>
-          </a:bodyPr>
-          <a:lstStyle/>
-          <a:p>
-            <a:pPr marL="0" lvl="0" indent="0" algn="l" rtl="0">
-              <a:spcBef>
-                <a:spcPts val="600"/>
-              </a:spcBef>
-              <a:spcAft>
-                <a:spcPts val="0"/>
-              </a:spcAft>
-              <a:buNone/>
-            </a:pPr>
-            <a:r>
-              <a:rPr lang="en" b="1"/>
-              <a:t>White</a:t>
-            </a:r>
-            <a:endParaRPr b="1"/>
-          </a:p>
-          <a:p>
-            <a:pPr marL="0" lvl="0" indent="0" algn="l" rtl="0">
-              <a:spcBef>
-                <a:spcPts val="600"/>
-              </a:spcBef>
-              <a:spcAft>
-                <a:spcPts val="0"/>
-              </a:spcAft>
-              <a:buNone/>
-            </a:pPr>
-            <a:r>
-              <a:rPr lang="en"/>
-              <a:t>Is the color of milk and fresh snow, the color produced by the combination of all the colors of the visible spectrum.</a:t>
-            </a:r>
-            <a:endParaRPr/>
-          </a:p>
-        </p:txBody>
-      </p:sp>
-      <p:sp>
-        <p:nvSpPr>
-          <p:cNvPr id="130" name="Google Shape;130;p19"/>
-          <p:cNvSpPr txBox="1">
-            <a:spLocks noGrp="1"/>
-          </p:cNvSpPr>
-          <p:nvPr>
-            <p:ph type="title"/>
-          </p:nvPr>
-        </p:nvSpPr>
-        <p:spPr>
-          <a:xfrm>
-            <a:off x="1101500" y="1048150"/>
-            <a:ext cx="1836300" cy="1907100"/>
-          </a:xfrm>
-          <a:prstGeom prst="rect">
-            <a:avLst/>
-          </a:prstGeom>
-        </p:spPr>
-        <p:txBody>
-          <a:bodyPr spcFirstLastPara="1" wrap="square" lIns="91425" tIns="91425" rIns="91425" bIns="91425" anchor="t" anchorCtr="0">
-            <a:noAutofit/>
-          </a:bodyPr>
-          <a:lstStyle/>
-          <a:p>
-            <a:pPr marL="0" lvl="0" indent="0" algn="l" rtl="0">
-              <a:spcBef>
-                <a:spcPts val="0"/>
-              </a:spcBef>
-              <a:spcAft>
-                <a:spcPts val="0"/>
-              </a:spcAft>
-              <a:buNone/>
-            </a:pPr>
-            <a:r>
-              <a:rPr lang="en"/>
-              <a:t>You can also split your content</a:t>
-            </a:r>
-            <a:endParaRPr/>
-          </a:p>
-        </p:txBody>
-      </p:sp>
-      <p:sp>
-        <p:nvSpPr>
-          <p:cNvPr id="131" name="Google Shape;131;p19"/>
-          <p:cNvSpPr txBox="1">
-            <a:spLocks noGrp="1"/>
-          </p:cNvSpPr>
-          <p:nvPr>
-            <p:ph type="body" idx="2"/>
-          </p:nvPr>
-        </p:nvSpPr>
-        <p:spPr>
-          <a:xfrm>
-            <a:off x="6220100" y="992250"/>
-            <a:ext cx="2466600" cy="3933000"/>
-          </a:xfrm>
-          <a:prstGeom prst="rect">
-            <a:avLst/>
-          </a:prstGeom>
-        </p:spPr>
-        <p:txBody>
-          <a:bodyPr spcFirstLastPara="1" wrap="square" lIns="91425" tIns="91425" rIns="91425" bIns="91425" anchor="t" anchorCtr="0">
-            <a:noAutofit/>
-          </a:bodyPr>
-          <a:lstStyle/>
-          <a:p>
-            <a:pPr marL="0" lvl="0" indent="0" algn="l" rtl="0">
-              <a:spcBef>
-                <a:spcPts val="600"/>
-              </a:spcBef>
-              <a:spcAft>
-                <a:spcPts val="0"/>
-              </a:spcAft>
-              <a:buNone/>
-            </a:pPr>
-            <a:r>
-              <a:rPr lang="en" b="1"/>
-              <a:t>Black</a:t>
-            </a:r>
-            <a:endParaRPr b="1"/>
-          </a:p>
-          <a:p>
-            <a:pPr marL="0" lvl="0" indent="0" algn="l" rtl="0">
-              <a:spcBef>
-                <a:spcPts val="600"/>
-              </a:spcBef>
-              <a:spcAft>
-                <a:spcPts val="0"/>
-              </a:spcAft>
-              <a:buNone/>
-            </a:pPr>
-            <a:r>
-              <a:rPr lang="en"/>
-              <a:t>Is the color of coal, ebony, and of outer space. It is the darkest color, the result of the absence of or complete absorption of light.</a:t>
-            </a:r>
-            <a:endParaRPr/>
-          </a:p>
-        </p:txBody>
-      </p:sp>
-      <p:sp>
-        <p:nvSpPr>
-          <p:cNvPr id="132" name="Google Shape;132;p19"/>
-          <p:cNvSpPr txBox="1">
-            <a:spLocks noGrp="1"/>
-          </p:cNvSpPr>
-          <p:nvPr>
-            <p:ph type="sldNum" idx="12"/>
-          </p:nvPr>
-        </p:nvSpPr>
-        <p:spPr>
-          <a:xfrm>
-            <a:off x="8536449" y="4749851"/>
-            <a:ext cx="548700" cy="393600"/>
-          </a:xfrm>
-          <a:prstGeom prst="rect">
-            <a:avLst/>
-          </a:prstGeom>
-        </p:spPr>
-        <p:txBody>
-          <a:bodyPr spcFirstLastPara="1" wrap="square" lIns="91425" tIns="91425" rIns="91425" bIns="91425" anchor="t" anchorCtr="0">
-            <a:noAutofit/>
-          </a:bodyPr>
-          <a:lstStyle/>
-          <a:p>
-            <a:pPr marL="0" lvl="0" indent="0" algn="r" rtl="0">
-              <a:spcBef>
-                <a:spcPts val="0"/>
-              </a:spcBef>
-              <a:spcAft>
-                <a:spcPts val="0"/>
-              </a:spcAft>
-              <a:buNone/>
-            </a:pPr>
-            <a:fld id="{00000000-1234-1234-1234-123412341234}" type="slidenum">
-              <a:rPr lang="en"/>
-              <a:pPr marL="0" lvl="0" indent="0" algn="r" rtl="0">
-                <a:spcBef>
-                  <a:spcPts val="0"/>
-                </a:spcBef>
-                <a:spcAft>
-                  <a:spcPts val="0"/>
-                </a:spcAft>
-                <a:buNone/>
-              </a:pPr>
-              <a:t>6</a:t>
-            </a:fld>
-            <a:endParaRPr/>
-          </a:p>
-        </p:txBody>
-      </p:sp>
-    </p:spTree>
-  </p:cSld>
-  <p:clrMapOvr>
-    <a:masterClrMapping/>
-  </p:clrMapOvr>
-</p:sld>
-</file>
-
-<file path=ppt/slides/slide7.xml><?xml version="1.0" encoding="utf-8"?>
 <p:sld xmlns:a="http://schemas.openxmlformats.org/drawingml/2006/main" xmlns:r="http://schemas.openxmlformats.org/officeDocument/2006/relationships" xmlns:p="http://schemas.openxmlformats.org/presentationml/2006/main">
   <p:cSld>
     <p:spTree>
@@ -13520,7 +13193,7 @@
                 </a:spcAft>
                 <a:buNone/>
               </a:pPr>
-              <a:t>7</a:t>
+              <a:t>6</a:t>
             </a:fld>
             <a:endParaRPr/>
           </a:p>
@@ -13531,10 +13204,17 @@
   <p:clrMapOvr>
     <a:masterClrMapping/>
   </p:clrMapOvr>
+  <p:timing>
+    <p:tnLst>
+      <p:par>
+        <p:cTn id="1" dur="indefinite" restart="never" nodeType="tmRoot"/>
+      </p:par>
+    </p:tnLst>
+  </p:timing>
 </p:sld>
 </file>
 
-<file path=ppt/slides/slide8.xml><?xml version="1.0" encoding="utf-8"?>
+<file path=ppt/slides/slide7.xml><?xml version="1.0" encoding="utf-8"?>
 <p:sld xmlns:a="http://schemas.openxmlformats.org/drawingml/2006/main" xmlns:r="http://schemas.openxmlformats.org/officeDocument/2006/relationships" xmlns:p="http://schemas.openxmlformats.org/presentationml/2006/main">
   <p:cSld>
     <p:spTree>
@@ -13680,7 +13360,7 @@
                 </a:spcAft>
                 <a:buNone/>
               </a:pPr>
-              <a:t>8</a:t>
+              <a:t>7</a:t>
             </a:fld>
             <a:endParaRPr/>
           </a:p>
@@ -13691,6 +13371,13 @@
   <p:clrMapOvr>
     <a:masterClrMapping/>
   </p:clrMapOvr>
+  <p:timing>
+    <p:tnLst>
+      <p:par>
+        <p:cTn id="1" dur="indefinite" restart="never" nodeType="tmRoot"/>
+      </p:par>
+    </p:tnLst>
+  </p:timing>
 </p:sld>
 </file>
 

</xml_diff>